<commit_message>
Prototype of ElementTreeWriter and installDSEGLoader
</commit_message>
<xml_diff>
--- a/Hive System Architecture.pptx
+++ b/Hive System Architecture.pptx
@@ -7,6 +7,7 @@
   <p:sldIdLst>
     <p:sldId id="256" r:id="rId2"/>
     <p:sldId id="257" r:id="rId3"/>
+    <p:sldId id="258" r:id="rId4"/>
   </p:sldIdLst>
   <p:sldSz cx="9144000" cy="6858000" type="screen4x3"/>
   <p:notesSz cx="6858000" cy="9144000"/>
@@ -3199,8 +3200,8 @@
         </p:nvSpPr>
         <p:spPr>
           <a:xfrm>
-            <a:off x="2299586" y="3095470"/>
-            <a:ext cx="903818" cy="1281495"/>
+            <a:off x="3164484" y="2407915"/>
+            <a:ext cx="833109" cy="1270053"/>
           </a:xfrm>
           <a:prstGeom prst="rect">
             <a:avLst/>
@@ -3226,17 +3227,17 @@
           <a:p>
             <a:pPr algn="ctr"/>
             <a:r>
-              <a:rPr lang="en-US" dirty="0" smtClean="0"/>
+              <a:rPr lang="en-US" sz="1600" dirty="0" smtClean="0"/>
               <a:t>Hive</a:t>
             </a:r>
           </a:p>
           <a:p>
             <a:pPr algn="ctr"/>
             <a:r>
-              <a:rPr lang="en-US" dirty="0" smtClean="0"/>
-              <a:t>Node Service</a:t>
-            </a:r>
-            <a:endParaRPr lang="en-US" dirty="0"/>
+              <a:rPr lang="en-US" sz="1600" dirty="0" smtClean="0"/>
+              <a:t>Agency</a:t>
+            </a:r>
+            <a:endParaRPr lang="en-US" sz="1600" dirty="0"/>
           </a:p>
         </p:txBody>
       </p:sp>
@@ -3248,8 +3249,8 @@
         </p:nvSpPr>
         <p:spPr>
           <a:xfrm>
-            <a:off x="457200" y="1409852"/>
-            <a:ext cx="903818" cy="1281495"/>
+            <a:off x="1471083" y="1629833"/>
+            <a:ext cx="789489" cy="1206500"/>
           </a:xfrm>
           <a:prstGeom prst="rect">
             <a:avLst/>
@@ -3275,24 +3276,24 @@
           <a:p>
             <a:pPr algn="ctr"/>
             <a:r>
-              <a:rPr lang="en-US" dirty="0" smtClean="0"/>
+              <a:rPr lang="en-US" sz="1600" dirty="0" smtClean="0"/>
               <a:t>Hive</a:t>
             </a:r>
           </a:p>
           <a:p>
             <a:pPr algn="ctr"/>
             <a:r>
-              <a:rPr lang="en-US" dirty="0" smtClean="0"/>
+              <a:rPr lang="en-US" sz="1600" dirty="0" smtClean="0"/>
               <a:t>Web</a:t>
             </a:r>
           </a:p>
           <a:p>
             <a:pPr algn="ctr"/>
             <a:r>
-              <a:rPr lang="en-US" dirty="0" smtClean="0"/>
+              <a:rPr lang="en-US" sz="1600" dirty="0" smtClean="0"/>
               <a:t>UI</a:t>
             </a:r>
-            <a:endParaRPr lang="en-US" dirty="0"/>
+            <a:endParaRPr lang="en-US" sz="1600" dirty="0"/>
           </a:p>
         </p:txBody>
       </p:sp>
@@ -3304,8 +3305,8 @@
         </p:nvSpPr>
         <p:spPr>
           <a:xfrm>
-            <a:off x="457200" y="3084028"/>
-            <a:ext cx="903818" cy="1281495"/>
+            <a:off x="1471083" y="3095470"/>
+            <a:ext cx="789490" cy="1270053"/>
           </a:xfrm>
           <a:prstGeom prst="rect">
             <a:avLst/>
@@ -3331,10 +3332,10 @@
           <a:p>
             <a:pPr algn="ctr"/>
             <a:r>
-              <a:rPr lang="en-US" dirty="0" smtClean="0"/>
+              <a:rPr lang="en-US" sz="1600" dirty="0" smtClean="0"/>
               <a:t>Hive Script Library</a:t>
             </a:r>
-            <a:endParaRPr lang="en-US" dirty="0"/>
+            <a:endParaRPr lang="en-US" sz="1600" dirty="0"/>
           </a:p>
         </p:txBody>
       </p:sp>
@@ -3346,8 +3347,8 @@
         </p:nvSpPr>
         <p:spPr>
           <a:xfrm>
-            <a:off x="457200" y="4838296"/>
-            <a:ext cx="903818" cy="1281495"/>
+            <a:off x="417009" y="4838296"/>
+            <a:ext cx="789490" cy="1281495"/>
           </a:xfrm>
           <a:prstGeom prst="rect">
             <a:avLst/>
@@ -3373,10 +3374,10 @@
           <a:p>
             <a:pPr algn="ctr"/>
             <a:r>
-              <a:rPr lang="en-US" dirty="0" smtClean="0"/>
+              <a:rPr lang="en-US" sz="1600" dirty="0" smtClean="0"/>
               <a:t>Hive Voice UI</a:t>
             </a:r>
-            <a:endParaRPr lang="en-US" dirty="0"/>
+            <a:endParaRPr lang="en-US" sz="1600" dirty="0"/>
           </a:p>
         </p:txBody>
       </p:sp>
@@ -3388,8 +3389,8 @@
         </p:nvCxnSpPr>
         <p:spPr>
           <a:xfrm>
-            <a:off x="1361018" y="2469477"/>
-            <a:ext cx="903911" cy="855647"/>
+            <a:off x="2260573" y="2469477"/>
+            <a:ext cx="903911" cy="366856"/>
           </a:xfrm>
           <a:prstGeom prst="bentConnector3">
             <a:avLst/>
@@ -3417,16 +3418,20 @@
       <p:cxnSp>
         <p:nvCxnSpPr>
           <p:cNvPr id="14" name="Elbow Connector 13"/>
-          <p:cNvCxnSpPr/>
+          <p:cNvCxnSpPr>
+            <a:endCxn id="5" idx="2"/>
+          </p:cNvCxnSpPr>
           <p:nvPr/>
         </p:nvCxnSpPr>
         <p:spPr>
-          <a:xfrm flipV="1">
-            <a:off x="1361018" y="4180771"/>
-            <a:ext cx="903911" cy="796464"/>
+          <a:xfrm rot="5400000" flipH="1" flipV="1">
+            <a:off x="976307" y="4595715"/>
+            <a:ext cx="1119712" cy="659329"/>
           </a:xfrm>
           <a:prstGeom prst="bentConnector3">
-            <a:avLst/>
+            <a:avLst>
+              <a:gd name="adj1" fmla="val 850"/>
+            </a:avLst>
           </a:prstGeom>
           <a:ln>
             <a:headEnd type="arrow"/>
@@ -3448,43 +3453,6 @@
           </a:fontRef>
         </p:style>
       </p:cxnSp>
-      <p:cxnSp>
-        <p:nvCxnSpPr>
-          <p:cNvPr id="17" name="Straight Arrow Connector 16"/>
-          <p:cNvCxnSpPr>
-            <a:stCxn id="5" idx="3"/>
-            <a:endCxn id="3" idx="1"/>
-          </p:cNvCxnSpPr>
-          <p:nvPr/>
-        </p:nvCxnSpPr>
-        <p:spPr>
-          <a:xfrm>
-            <a:off x="1361018" y="3724776"/>
-            <a:ext cx="938568" cy="11442"/>
-          </a:xfrm>
-          <a:prstGeom prst="straightConnector1">
-            <a:avLst/>
-          </a:prstGeom>
-          <a:ln>
-            <a:headEnd type="arrow"/>
-            <a:tailEnd type="arrow"/>
-          </a:ln>
-        </p:spPr>
-        <p:style>
-          <a:lnRef idx="2">
-            <a:schemeClr val="accent1"/>
-          </a:lnRef>
-          <a:fillRef idx="0">
-            <a:schemeClr val="accent1"/>
-          </a:fillRef>
-          <a:effectRef idx="1">
-            <a:schemeClr val="accent1"/>
-          </a:effectRef>
-          <a:fontRef idx="minor">
-            <a:schemeClr val="tx1"/>
-          </a:fontRef>
-        </p:style>
-      </p:cxnSp>
       <p:sp>
         <p:nvSpPr>
           <p:cNvPr id="18" name="TextBox 17"/>
@@ -3493,8 +3461,8 @@
         </p:nvSpPr>
         <p:spPr>
           <a:xfrm>
-            <a:off x="1716110" y="2100145"/>
-            <a:ext cx="736099" cy="369332"/>
+            <a:off x="2615665" y="2100145"/>
+            <a:ext cx="590526" cy="338554"/>
           </a:xfrm>
           <a:prstGeom prst="rect">
             <a:avLst/>
@@ -3508,10 +3476,10 @@
           <a:lstStyle/>
           <a:p>
             <a:r>
-              <a:rPr lang="en-US" dirty="0" smtClean="0"/>
-              <a:t>HTML</a:t>
-            </a:r>
-            <a:endParaRPr lang="en-US" dirty="0"/>
+              <a:rPr lang="en-US" sz="1600" dirty="0" smtClean="0"/>
+              <a:t>REST</a:t>
+            </a:r>
+            <a:endParaRPr lang="en-US" sz="1600" dirty="0"/>
           </a:p>
         </p:txBody>
       </p:sp>
@@ -3523,8 +3491,8 @@
         </p:nvSpPr>
         <p:spPr>
           <a:xfrm>
-            <a:off x="1464079" y="3355444"/>
-            <a:ext cx="646331" cy="369332"/>
+            <a:off x="2658897" y="3677968"/>
+            <a:ext cx="590526" cy="338554"/>
           </a:xfrm>
           <a:prstGeom prst="rect">
             <a:avLst/>
@@ -3538,40 +3506,10 @@
           <a:lstStyle/>
           <a:p>
             <a:r>
-              <a:rPr lang="en-US" dirty="0" smtClean="0"/>
+              <a:rPr lang="en-US" sz="1600" dirty="0" smtClean="0"/>
               <a:t>REST</a:t>
             </a:r>
-            <a:endParaRPr lang="en-US" dirty="0"/>
-          </a:p>
-        </p:txBody>
-      </p:sp>
-      <p:sp>
-        <p:nvSpPr>
-          <p:cNvPr id="20" name="TextBox 19"/>
-          <p:cNvSpPr txBox="1"/>
-          <p:nvPr/>
-        </p:nvSpPr>
-        <p:spPr>
-          <a:xfrm>
-            <a:off x="1500460" y="4990355"/>
-            <a:ext cx="646331" cy="369332"/>
-          </a:xfrm>
-          <a:prstGeom prst="rect">
-            <a:avLst/>
-          </a:prstGeom>
-          <a:noFill/>
-        </p:spPr>
-        <p:txBody>
-          <a:bodyPr wrap="none" rtlCol="0">
-            <a:spAutoFit/>
-          </a:bodyPr>
-          <a:lstStyle/>
-          <a:p>
-            <a:r>
-              <a:rPr lang="en-US" dirty="0" smtClean="0"/>
-              <a:t>REST</a:t>
-            </a:r>
-            <a:endParaRPr lang="en-US" dirty="0"/>
+            <a:endParaRPr lang="en-US" sz="1600" dirty="0"/>
           </a:p>
         </p:txBody>
       </p:sp>
@@ -3583,8 +3521,8 @@
         </p:nvSpPr>
         <p:spPr>
           <a:xfrm>
-            <a:off x="4947212" y="1880218"/>
-            <a:ext cx="1006784" cy="1178517"/>
+            <a:off x="4386253" y="2433252"/>
+            <a:ext cx="799538" cy="1215252"/>
           </a:xfrm>
           <a:prstGeom prst="rect">
             <a:avLst/>
@@ -3610,49 +3548,13 @@
           <a:p>
             <a:pPr algn="ctr"/>
             <a:r>
-              <a:rPr lang="en-US" dirty="0" smtClean="0"/>
+              <a:rPr lang="en-US" sz="1600" dirty="0" smtClean="0"/>
               <a:t>Hive Shell</a:t>
             </a:r>
-            <a:endParaRPr lang="en-US" dirty="0"/>
-          </a:p>
-        </p:txBody>
-      </p:sp>
-      <p:cxnSp>
-        <p:nvCxnSpPr>
-          <p:cNvPr id="23" name="Elbow Connector 22"/>
-          <p:cNvCxnSpPr>
-            <a:endCxn id="21" idx="1"/>
-          </p:cNvCxnSpPr>
-          <p:nvPr/>
-        </p:nvCxnSpPr>
-        <p:spPr>
-          <a:xfrm flipV="1">
-            <a:off x="3203404" y="2469477"/>
-            <a:ext cx="1743808" cy="796464"/>
-          </a:xfrm>
-          <a:prstGeom prst="bentConnector3">
-            <a:avLst/>
-          </a:prstGeom>
-          <a:ln>
-            <a:headEnd type="arrow"/>
-            <a:tailEnd type="arrow"/>
-          </a:ln>
-        </p:spPr>
-        <p:style>
-          <a:lnRef idx="2">
-            <a:schemeClr val="accent1"/>
-          </a:lnRef>
-          <a:fillRef idx="0">
-            <a:schemeClr val="accent1"/>
-          </a:fillRef>
-          <a:effectRef idx="1">
-            <a:schemeClr val="accent1"/>
-          </a:effectRef>
-          <a:fontRef idx="minor">
-            <a:schemeClr val="tx1"/>
-          </a:fontRef>
-        </p:style>
-      </p:cxnSp>
+            <a:endParaRPr lang="en-US" sz="1600" dirty="0"/>
+          </a:p>
+        </p:txBody>
+      </p:sp>
       <p:sp>
         <p:nvSpPr>
           <p:cNvPr id="24" name="Rectangle 23"/>
@@ -3661,8 +3563,8 @@
         </p:nvSpPr>
         <p:spPr>
           <a:xfrm>
-            <a:off x="6377277" y="1880218"/>
-            <a:ext cx="1006784" cy="1178517"/>
+            <a:off x="5519994" y="2443835"/>
+            <a:ext cx="766473" cy="1178517"/>
           </a:xfrm>
           <a:prstGeom prst="rect">
             <a:avLst/>
@@ -3688,10 +3590,10 @@
           <a:p>
             <a:pPr algn="ctr"/>
             <a:r>
-              <a:rPr lang="en-US" dirty="0" smtClean="0"/>
+              <a:rPr lang="en-US" sz="1600" dirty="0" smtClean="0"/>
               <a:t>BASH</a:t>
             </a:r>
-            <a:endParaRPr lang="en-US" dirty="0"/>
+            <a:endParaRPr lang="en-US" sz="1600" dirty="0"/>
           </a:p>
         </p:txBody>
       </p:sp>
@@ -3705,9 +3607,9 @@
           <p:nvPr/>
         </p:nvCxnSpPr>
         <p:spPr>
-          <a:xfrm>
-            <a:off x="5953996" y="2469477"/>
-            <a:ext cx="423281" cy="0"/>
+          <a:xfrm flipV="1">
+            <a:off x="5185791" y="3033094"/>
+            <a:ext cx="334203" cy="7784"/>
           </a:xfrm>
           <a:prstGeom prst="straightConnector1">
             <a:avLst/>
@@ -3740,8 +3642,8 @@
         </p:nvSpPr>
         <p:spPr>
           <a:xfrm>
-            <a:off x="7711769" y="1880218"/>
-            <a:ext cx="1006784" cy="1178517"/>
+            <a:off x="6611077" y="2422669"/>
+            <a:ext cx="786648" cy="1215252"/>
           </a:xfrm>
           <a:prstGeom prst="rect">
             <a:avLst/>
@@ -3767,17 +3669,17 @@
           <a:p>
             <a:pPr algn="ctr"/>
             <a:r>
-              <a:rPr lang="en-US" dirty="0" smtClean="0"/>
+              <a:rPr lang="en-US" sz="1600" dirty="0" smtClean="0"/>
               <a:t>Node Local </a:t>
             </a:r>
           </a:p>
           <a:p>
             <a:pPr algn="ctr"/>
             <a:r>
-              <a:rPr lang="en-US" dirty="0" smtClean="0"/>
+              <a:rPr lang="en-US" sz="1600" dirty="0" smtClean="0"/>
               <a:t>OS</a:t>
             </a:r>
-            <a:endParaRPr lang="en-US" dirty="0"/>
+            <a:endParaRPr lang="en-US" sz="1600" dirty="0"/>
           </a:p>
         </p:txBody>
       </p:sp>
@@ -3791,9 +3693,9 @@
           <p:nvPr/>
         </p:nvCxnSpPr>
         <p:spPr>
-          <a:xfrm>
-            <a:off x="7384061" y="2469477"/>
-            <a:ext cx="327708" cy="0"/>
+          <a:xfrm flipV="1">
+            <a:off x="6286467" y="3030295"/>
+            <a:ext cx="324610" cy="2799"/>
           </a:xfrm>
           <a:prstGeom prst="straightConnector1">
             <a:avLst/>
@@ -3820,16 +3722,16 @@
       </p:cxnSp>
       <p:sp>
         <p:nvSpPr>
-          <p:cNvPr id="29" name="Can 28"/>
+          <p:cNvPr id="30" name="Rectangle 29"/>
           <p:cNvSpPr/>
           <p:nvPr/>
         </p:nvSpPr>
         <p:spPr>
           <a:xfrm>
-            <a:off x="4947212" y="3560249"/>
-            <a:ext cx="903724" cy="1214819"/>
-          </a:xfrm>
-          <a:prstGeom prst="can">
+            <a:off x="279492" y="3084887"/>
+            <a:ext cx="927007" cy="1280636"/>
+          </a:xfrm>
+          <a:prstGeom prst="rect">
             <a:avLst/>
           </a:prstGeom>
         </p:spPr>
@@ -3853,22 +3755,135 @@
           <a:p>
             <a:pPr algn="ctr"/>
             <a:r>
+              <a:rPr lang="en-US" sz="1600" dirty="0" smtClean="0"/>
+              <a:t>Hive </a:t>
+            </a:r>
+            <a:r>
+              <a:rPr lang="en-US" sz="1600" dirty="0" err="1" smtClean="0"/>
+              <a:t>Cmdline</a:t>
+            </a:r>
+            <a:endParaRPr lang="en-US" sz="1600" dirty="0"/>
+          </a:p>
+        </p:txBody>
+      </p:sp>
+      <p:cxnSp>
+        <p:nvCxnSpPr>
+          <p:cNvPr id="54" name="Elbow Connector 53"/>
+          <p:cNvCxnSpPr>
+            <a:stCxn id="5" idx="3"/>
+          </p:cNvCxnSpPr>
+          <p:nvPr/>
+        </p:nvCxnSpPr>
+        <p:spPr>
+          <a:xfrm flipV="1">
+            <a:off x="2260573" y="3355444"/>
+            <a:ext cx="884154" cy="375053"/>
+          </a:xfrm>
+          <a:prstGeom prst="bentConnector3">
+            <a:avLst/>
+          </a:prstGeom>
+          <a:ln>
+            <a:headEnd type="arrow"/>
+            <a:tailEnd type="arrow"/>
+          </a:ln>
+        </p:spPr>
+        <p:style>
+          <a:lnRef idx="2">
+            <a:schemeClr val="accent1"/>
+          </a:lnRef>
+          <a:fillRef idx="0">
+            <a:schemeClr val="accent1"/>
+          </a:fillRef>
+          <a:effectRef idx="1">
+            <a:schemeClr val="accent1"/>
+          </a:effectRef>
+          <a:fontRef idx="minor">
+            <a:schemeClr val="tx1"/>
+          </a:fontRef>
+        </p:style>
+      </p:cxnSp>
+      <p:cxnSp>
+        <p:nvCxnSpPr>
+          <p:cNvPr id="56" name="Straight Arrow Connector 55"/>
+          <p:cNvCxnSpPr/>
+          <p:nvPr/>
+        </p:nvCxnSpPr>
+        <p:spPr>
+          <a:xfrm flipV="1">
+            <a:off x="4008176" y="3042591"/>
+            <a:ext cx="334203" cy="7784"/>
+          </a:xfrm>
+          <a:prstGeom prst="straightConnector1">
+            <a:avLst/>
+          </a:prstGeom>
+          <a:ln>
+            <a:headEnd type="arrow"/>
+            <a:tailEnd type="arrow"/>
+          </a:ln>
+        </p:spPr>
+        <p:style>
+          <a:lnRef idx="2">
+            <a:schemeClr val="accent1"/>
+          </a:lnRef>
+          <a:fillRef idx="0">
+            <a:schemeClr val="accent1"/>
+          </a:fillRef>
+          <a:effectRef idx="1">
+            <a:schemeClr val="accent1"/>
+          </a:effectRef>
+          <a:fontRef idx="minor">
+            <a:schemeClr val="tx1"/>
+          </a:fontRef>
+        </p:style>
+      </p:cxnSp>
+    </p:spTree>
+    <p:extLst>
+      <p:ext uri="{BB962C8B-B14F-4D97-AF65-F5344CB8AC3E}">
+        <p14:creationId xmlns:p14="http://schemas.microsoft.com/office/powerpoint/2010/main" val="487298151"/>
+      </p:ext>
+    </p:extLst>
+  </p:cSld>
+  <p:clrMapOvr>
+    <a:masterClrMapping/>
+  </p:clrMapOvr>
+</p:sld>
+</file>
+
+<file path=ppt/slides/slide3.xml><?xml version="1.0" encoding="utf-8"?>
+<p:sld xmlns:a="http://schemas.openxmlformats.org/drawingml/2006/main" xmlns:r="http://schemas.openxmlformats.org/officeDocument/2006/relationships" xmlns:p="http://schemas.openxmlformats.org/presentationml/2006/main">
+  <p:cSld>
+    <p:spTree>
+      <p:nvGrpSpPr>
+        <p:cNvPr id="1" name=""/>
+        <p:cNvGrpSpPr/>
+        <p:nvPr/>
+      </p:nvGrpSpPr>
+      <p:grpSpPr>
+        <a:xfrm>
+          <a:off x="0" y="0"/>
+          <a:ext cx="0" cy="0"/>
+          <a:chOff x="0" y="0"/>
+          <a:chExt cx="0" cy="0"/>
+        </a:xfrm>
+      </p:grpSpPr>
+      <p:sp>
+        <p:nvSpPr>
+          <p:cNvPr id="2" name="Title 1"/>
+          <p:cNvSpPr>
+            <a:spLocks noGrp="1"/>
+          </p:cNvSpPr>
+          <p:nvPr>
+            <p:ph type="title"/>
+          </p:nvPr>
+        </p:nvSpPr>
+        <p:spPr/>
+        <p:txBody>
+          <a:bodyPr/>
+          <a:lstStyle/>
+          <a:p>
+            <a:r>
               <a:rPr lang="en-US" dirty="0" smtClean="0"/>
-              <a:t>Hive </a:t>
-            </a:r>
-          </a:p>
-          <a:p>
-            <a:pPr algn="ctr"/>
-            <a:r>
-              <a:rPr lang="en-US" dirty="0" smtClean="0"/>
-              <a:t>Code</a:t>
-            </a:r>
-          </a:p>
-          <a:p>
-            <a:pPr algn="ctr"/>
-            <a:r>
-              <a:rPr lang="en-US" dirty="0" smtClean="0"/>
-              <a:t>Assets</a:t>
+              <a:t>Schematic - Remote</a:t>
             </a:r>
             <a:endParaRPr lang="en-US" dirty="0"/>
           </a:p>
@@ -3876,14 +3891,14 @@
       </p:sp>
       <p:sp>
         <p:nvSpPr>
-          <p:cNvPr id="30" name="Rectangle 29"/>
+          <p:cNvPr id="3" name="Rectangle 2"/>
           <p:cNvSpPr/>
           <p:nvPr/>
         </p:nvSpPr>
         <p:spPr>
           <a:xfrm>
-            <a:off x="2110410" y="5461000"/>
-            <a:ext cx="1445590" cy="751417"/>
+            <a:off x="3164484" y="2407915"/>
+            <a:ext cx="833109" cy="1270053"/>
           </a:xfrm>
           <a:prstGeom prst="rect">
             <a:avLst/>
@@ -3909,21 +3924,735 @@
           <a:p>
             <a:pPr algn="ctr"/>
             <a:r>
-              <a:rPr lang="en-US" dirty="0" smtClean="0"/>
+              <a:rPr lang="en-US" sz="1600" dirty="0" smtClean="0"/>
+              <a:t>Hive</a:t>
+            </a:r>
+          </a:p>
+          <a:p>
+            <a:pPr algn="ctr"/>
+            <a:r>
+              <a:rPr lang="en-US" sz="1600" dirty="0" smtClean="0"/>
+              <a:t>Agency</a:t>
+            </a:r>
+            <a:endParaRPr lang="en-US" sz="1600" dirty="0"/>
+          </a:p>
+        </p:txBody>
+      </p:sp>
+      <p:sp>
+        <p:nvSpPr>
+          <p:cNvPr id="4" name="Rectangle 3"/>
+          <p:cNvSpPr/>
+          <p:nvPr/>
+        </p:nvSpPr>
+        <p:spPr>
+          <a:xfrm>
+            <a:off x="1471083" y="1629833"/>
+            <a:ext cx="789489" cy="1206500"/>
+          </a:xfrm>
+          <a:prstGeom prst="rect">
+            <a:avLst/>
+          </a:prstGeom>
+        </p:spPr>
+        <p:style>
+          <a:lnRef idx="1">
+            <a:schemeClr val="accent1"/>
+          </a:lnRef>
+          <a:fillRef idx="3">
+            <a:schemeClr val="accent1"/>
+          </a:fillRef>
+          <a:effectRef idx="2">
+            <a:schemeClr val="accent1"/>
+          </a:effectRef>
+          <a:fontRef idx="minor">
+            <a:schemeClr val="lt1"/>
+          </a:fontRef>
+        </p:style>
+        <p:txBody>
+          <a:bodyPr rtlCol="0" anchor="ctr"/>
+          <a:lstStyle/>
+          <a:p>
+            <a:pPr algn="ctr"/>
+            <a:r>
+              <a:rPr lang="en-US" sz="1600" dirty="0" smtClean="0"/>
+              <a:t>Hive</a:t>
+            </a:r>
+          </a:p>
+          <a:p>
+            <a:pPr algn="ctr"/>
+            <a:r>
+              <a:rPr lang="en-US" sz="1600" dirty="0" smtClean="0"/>
+              <a:t>Web</a:t>
+            </a:r>
+          </a:p>
+          <a:p>
+            <a:pPr algn="ctr"/>
+            <a:r>
+              <a:rPr lang="en-US" sz="1600" dirty="0" smtClean="0"/>
+              <a:t>UI</a:t>
+            </a:r>
+            <a:endParaRPr lang="en-US" sz="1600" dirty="0"/>
+          </a:p>
+        </p:txBody>
+      </p:sp>
+      <p:sp>
+        <p:nvSpPr>
+          <p:cNvPr id="5" name="Rectangle 4"/>
+          <p:cNvSpPr/>
+          <p:nvPr/>
+        </p:nvSpPr>
+        <p:spPr>
+          <a:xfrm>
+            <a:off x="1471083" y="3095470"/>
+            <a:ext cx="789490" cy="1270053"/>
+          </a:xfrm>
+          <a:prstGeom prst="rect">
+            <a:avLst/>
+          </a:prstGeom>
+        </p:spPr>
+        <p:style>
+          <a:lnRef idx="1">
+            <a:schemeClr val="accent1"/>
+          </a:lnRef>
+          <a:fillRef idx="3">
+            <a:schemeClr val="accent1"/>
+          </a:fillRef>
+          <a:effectRef idx="2">
+            <a:schemeClr val="accent1"/>
+          </a:effectRef>
+          <a:fontRef idx="minor">
+            <a:schemeClr val="lt1"/>
+          </a:fontRef>
+        </p:style>
+        <p:txBody>
+          <a:bodyPr rtlCol="0" anchor="ctr"/>
+          <a:lstStyle/>
+          <a:p>
+            <a:pPr algn="ctr"/>
+            <a:r>
+              <a:rPr lang="en-US" sz="1600" dirty="0" smtClean="0"/>
+              <a:t>Hive Script Library</a:t>
+            </a:r>
+            <a:endParaRPr lang="en-US" sz="1600" dirty="0"/>
+          </a:p>
+        </p:txBody>
+      </p:sp>
+      <p:sp>
+        <p:nvSpPr>
+          <p:cNvPr id="7" name="Rectangle 6"/>
+          <p:cNvSpPr/>
+          <p:nvPr/>
+        </p:nvSpPr>
+        <p:spPr>
+          <a:xfrm>
+            <a:off x="417009" y="4838296"/>
+            <a:ext cx="789490" cy="1281495"/>
+          </a:xfrm>
+          <a:prstGeom prst="rect">
+            <a:avLst/>
+          </a:prstGeom>
+        </p:spPr>
+        <p:style>
+          <a:lnRef idx="1">
+            <a:schemeClr val="accent1"/>
+          </a:lnRef>
+          <a:fillRef idx="3">
+            <a:schemeClr val="accent1"/>
+          </a:fillRef>
+          <a:effectRef idx="2">
+            <a:schemeClr val="accent1"/>
+          </a:effectRef>
+          <a:fontRef idx="minor">
+            <a:schemeClr val="lt1"/>
+          </a:fontRef>
+        </p:style>
+        <p:txBody>
+          <a:bodyPr rtlCol="0" anchor="ctr"/>
+          <a:lstStyle/>
+          <a:p>
+            <a:pPr algn="ctr"/>
+            <a:r>
+              <a:rPr lang="en-US" sz="1600" dirty="0" smtClean="0"/>
+              <a:t>Hive Voice UI</a:t>
+            </a:r>
+            <a:endParaRPr lang="en-US" sz="1600" dirty="0"/>
+          </a:p>
+        </p:txBody>
+      </p:sp>
+      <p:cxnSp>
+        <p:nvCxnSpPr>
+          <p:cNvPr id="11" name="Elbow Connector 10"/>
+          <p:cNvCxnSpPr/>
+          <p:nvPr/>
+        </p:nvCxnSpPr>
+        <p:spPr>
+          <a:xfrm>
+            <a:off x="2260573" y="2469477"/>
+            <a:ext cx="903911" cy="366856"/>
+          </a:xfrm>
+          <a:prstGeom prst="bentConnector3">
+            <a:avLst/>
+          </a:prstGeom>
+          <a:ln>
+            <a:headEnd type="arrow"/>
+            <a:tailEnd type="arrow"/>
+          </a:ln>
+        </p:spPr>
+        <p:style>
+          <a:lnRef idx="2">
+            <a:schemeClr val="accent1"/>
+          </a:lnRef>
+          <a:fillRef idx="0">
+            <a:schemeClr val="accent1"/>
+          </a:fillRef>
+          <a:effectRef idx="1">
+            <a:schemeClr val="accent1"/>
+          </a:effectRef>
+          <a:fontRef idx="minor">
+            <a:schemeClr val="tx1"/>
+          </a:fontRef>
+        </p:style>
+      </p:cxnSp>
+      <p:cxnSp>
+        <p:nvCxnSpPr>
+          <p:cNvPr id="14" name="Elbow Connector 13"/>
+          <p:cNvCxnSpPr>
+            <a:endCxn id="5" idx="2"/>
+          </p:cNvCxnSpPr>
+          <p:nvPr/>
+        </p:nvCxnSpPr>
+        <p:spPr>
+          <a:xfrm rot="5400000" flipH="1" flipV="1">
+            <a:off x="976307" y="4595715"/>
+            <a:ext cx="1119712" cy="659329"/>
+          </a:xfrm>
+          <a:prstGeom prst="bentConnector3">
+            <a:avLst>
+              <a:gd name="adj1" fmla="val 850"/>
+            </a:avLst>
+          </a:prstGeom>
+          <a:ln>
+            <a:headEnd type="arrow"/>
+            <a:tailEnd type="arrow"/>
+          </a:ln>
+        </p:spPr>
+        <p:style>
+          <a:lnRef idx="2">
+            <a:schemeClr val="accent1"/>
+          </a:lnRef>
+          <a:fillRef idx="0">
+            <a:schemeClr val="accent1"/>
+          </a:fillRef>
+          <a:effectRef idx="1">
+            <a:schemeClr val="accent1"/>
+          </a:effectRef>
+          <a:fontRef idx="minor">
+            <a:schemeClr val="tx1"/>
+          </a:fontRef>
+        </p:style>
+      </p:cxnSp>
+      <p:sp>
+        <p:nvSpPr>
+          <p:cNvPr id="18" name="TextBox 17"/>
+          <p:cNvSpPr txBox="1"/>
+          <p:nvPr/>
+        </p:nvSpPr>
+        <p:spPr>
+          <a:xfrm>
+            <a:off x="2615665" y="2100145"/>
+            <a:ext cx="590526" cy="338554"/>
+          </a:xfrm>
+          <a:prstGeom prst="rect">
+            <a:avLst/>
+          </a:prstGeom>
+          <a:noFill/>
+        </p:spPr>
+        <p:txBody>
+          <a:bodyPr wrap="none" rtlCol="0">
+            <a:spAutoFit/>
+          </a:bodyPr>
+          <a:lstStyle/>
+          <a:p>
+            <a:r>
+              <a:rPr lang="en-US" sz="1600" dirty="0" smtClean="0"/>
+              <a:t>REST</a:t>
+            </a:r>
+            <a:endParaRPr lang="en-US" sz="1600" dirty="0"/>
+          </a:p>
+        </p:txBody>
+      </p:sp>
+      <p:sp>
+        <p:nvSpPr>
+          <p:cNvPr id="19" name="TextBox 18"/>
+          <p:cNvSpPr txBox="1"/>
+          <p:nvPr/>
+        </p:nvSpPr>
+        <p:spPr>
+          <a:xfrm>
+            <a:off x="2658897" y="3677968"/>
+            <a:ext cx="590526" cy="338554"/>
+          </a:xfrm>
+          <a:prstGeom prst="rect">
+            <a:avLst/>
+          </a:prstGeom>
+          <a:noFill/>
+        </p:spPr>
+        <p:txBody>
+          <a:bodyPr wrap="none" rtlCol="0">
+            <a:spAutoFit/>
+          </a:bodyPr>
+          <a:lstStyle/>
+          <a:p>
+            <a:r>
+              <a:rPr lang="en-US" sz="1600" dirty="0" smtClean="0"/>
+              <a:t>REST</a:t>
+            </a:r>
+            <a:endParaRPr lang="en-US" sz="1600" dirty="0"/>
+          </a:p>
+        </p:txBody>
+      </p:sp>
+      <p:sp>
+        <p:nvSpPr>
+          <p:cNvPr id="21" name="Rectangle 20"/>
+          <p:cNvSpPr/>
+          <p:nvPr/>
+        </p:nvSpPr>
+        <p:spPr>
+          <a:xfrm>
+            <a:off x="4354504" y="4224968"/>
+            <a:ext cx="799538" cy="1215252"/>
+          </a:xfrm>
+          <a:prstGeom prst="rect">
+            <a:avLst/>
+          </a:prstGeom>
+        </p:spPr>
+        <p:style>
+          <a:lnRef idx="1">
+            <a:schemeClr val="accent1"/>
+          </a:lnRef>
+          <a:fillRef idx="3">
+            <a:schemeClr val="accent1"/>
+          </a:fillRef>
+          <a:effectRef idx="2">
+            <a:schemeClr val="accent1"/>
+          </a:effectRef>
+          <a:fontRef idx="minor">
+            <a:schemeClr val="lt1"/>
+          </a:fontRef>
+        </p:style>
+        <p:txBody>
+          <a:bodyPr rtlCol="0" anchor="ctr"/>
+          <a:lstStyle/>
+          <a:p>
+            <a:pPr algn="ctr"/>
+            <a:r>
+              <a:rPr lang="en-US" sz="1600" dirty="0" smtClean="0"/>
+              <a:t>Hive Shell</a:t>
+            </a:r>
+            <a:endParaRPr lang="en-US" sz="1600" dirty="0"/>
+          </a:p>
+        </p:txBody>
+      </p:sp>
+      <p:sp>
+        <p:nvSpPr>
+          <p:cNvPr id="24" name="Rectangle 23"/>
+          <p:cNvSpPr/>
+          <p:nvPr/>
+        </p:nvSpPr>
+        <p:spPr>
+          <a:xfrm>
+            <a:off x="5488245" y="4235551"/>
+            <a:ext cx="766473" cy="1178517"/>
+          </a:xfrm>
+          <a:prstGeom prst="rect">
+            <a:avLst/>
+          </a:prstGeom>
+        </p:spPr>
+        <p:style>
+          <a:lnRef idx="1">
+            <a:schemeClr val="accent1"/>
+          </a:lnRef>
+          <a:fillRef idx="3">
+            <a:schemeClr val="accent1"/>
+          </a:fillRef>
+          <a:effectRef idx="2">
+            <a:schemeClr val="accent1"/>
+          </a:effectRef>
+          <a:fontRef idx="minor">
+            <a:schemeClr val="lt1"/>
+          </a:fontRef>
+        </p:style>
+        <p:txBody>
+          <a:bodyPr rtlCol="0" anchor="ctr"/>
+          <a:lstStyle/>
+          <a:p>
+            <a:pPr algn="ctr"/>
+            <a:r>
+              <a:rPr lang="en-US" sz="1600" dirty="0" smtClean="0"/>
+              <a:t>BASH</a:t>
+            </a:r>
+            <a:endParaRPr lang="en-US" sz="1600" dirty="0"/>
+          </a:p>
+        </p:txBody>
+      </p:sp>
+      <p:cxnSp>
+        <p:nvCxnSpPr>
+          <p:cNvPr id="26" name="Straight Arrow Connector 25"/>
+          <p:cNvCxnSpPr>
+            <a:stCxn id="21" idx="3"/>
+            <a:endCxn id="24" idx="1"/>
+          </p:cNvCxnSpPr>
+          <p:nvPr/>
+        </p:nvCxnSpPr>
+        <p:spPr>
+          <a:xfrm flipV="1">
+            <a:off x="5154042" y="4824810"/>
+            <a:ext cx="334203" cy="7784"/>
+          </a:xfrm>
+          <a:prstGeom prst="straightConnector1">
+            <a:avLst/>
+          </a:prstGeom>
+          <a:ln>
+            <a:headEnd type="arrow"/>
+            <a:tailEnd type="arrow"/>
+          </a:ln>
+        </p:spPr>
+        <p:style>
+          <a:lnRef idx="2">
+            <a:schemeClr val="accent1"/>
+          </a:lnRef>
+          <a:fillRef idx="0">
+            <a:schemeClr val="accent1"/>
+          </a:fillRef>
+          <a:effectRef idx="1">
+            <a:schemeClr val="accent1"/>
+          </a:effectRef>
+          <a:fontRef idx="minor">
+            <a:schemeClr val="tx1"/>
+          </a:fontRef>
+        </p:style>
+      </p:cxnSp>
+      <p:sp>
+        <p:nvSpPr>
+          <p:cNvPr id="27" name="Rectangle 26"/>
+          <p:cNvSpPr/>
+          <p:nvPr/>
+        </p:nvSpPr>
+        <p:spPr>
+          <a:xfrm>
+            <a:off x="6579328" y="4214385"/>
+            <a:ext cx="786648" cy="1215252"/>
+          </a:xfrm>
+          <a:prstGeom prst="rect">
+            <a:avLst/>
+          </a:prstGeom>
+        </p:spPr>
+        <p:style>
+          <a:lnRef idx="1">
+            <a:schemeClr val="accent1"/>
+          </a:lnRef>
+          <a:fillRef idx="3">
+            <a:schemeClr val="accent1"/>
+          </a:fillRef>
+          <a:effectRef idx="2">
+            <a:schemeClr val="accent1"/>
+          </a:effectRef>
+          <a:fontRef idx="minor">
+            <a:schemeClr val="lt1"/>
+          </a:fontRef>
+        </p:style>
+        <p:txBody>
+          <a:bodyPr rtlCol="0" anchor="ctr"/>
+          <a:lstStyle/>
+          <a:p>
+            <a:pPr algn="ctr"/>
+            <a:r>
+              <a:rPr lang="en-US" sz="1600" dirty="0" smtClean="0"/>
+              <a:t>Node Local </a:t>
+            </a:r>
+          </a:p>
+          <a:p>
+            <a:pPr algn="ctr"/>
+            <a:r>
+              <a:rPr lang="en-US" sz="1600" dirty="0" smtClean="0"/>
+              <a:t>OS</a:t>
+            </a:r>
+            <a:endParaRPr lang="en-US" sz="1600" dirty="0"/>
+          </a:p>
+        </p:txBody>
+      </p:sp>
+      <p:cxnSp>
+        <p:nvCxnSpPr>
+          <p:cNvPr id="28" name="Straight Arrow Connector 27"/>
+          <p:cNvCxnSpPr>
+            <a:stCxn id="24" idx="3"/>
+            <a:endCxn id="27" idx="1"/>
+          </p:cNvCxnSpPr>
+          <p:nvPr/>
+        </p:nvCxnSpPr>
+        <p:spPr>
+          <a:xfrm flipV="1">
+            <a:off x="6254718" y="4822011"/>
+            <a:ext cx="324610" cy="2799"/>
+          </a:xfrm>
+          <a:prstGeom prst="straightConnector1">
+            <a:avLst/>
+          </a:prstGeom>
+          <a:ln>
+            <a:headEnd type="arrow"/>
+            <a:tailEnd type="arrow"/>
+          </a:ln>
+        </p:spPr>
+        <p:style>
+          <a:lnRef idx="2">
+            <a:schemeClr val="accent1"/>
+          </a:lnRef>
+          <a:fillRef idx="0">
+            <a:schemeClr val="accent1"/>
+          </a:fillRef>
+          <a:effectRef idx="1">
+            <a:schemeClr val="accent1"/>
+          </a:effectRef>
+          <a:fontRef idx="minor">
+            <a:schemeClr val="tx1"/>
+          </a:fontRef>
+        </p:style>
+      </p:cxnSp>
+      <p:sp>
+        <p:nvSpPr>
+          <p:cNvPr id="30" name="Rectangle 29"/>
+          <p:cNvSpPr/>
+          <p:nvPr/>
+        </p:nvSpPr>
+        <p:spPr>
+          <a:xfrm>
+            <a:off x="279492" y="3084887"/>
+            <a:ext cx="927007" cy="1280636"/>
+          </a:xfrm>
+          <a:prstGeom prst="rect">
+            <a:avLst/>
+          </a:prstGeom>
+        </p:spPr>
+        <p:style>
+          <a:lnRef idx="1">
+            <a:schemeClr val="accent1"/>
+          </a:lnRef>
+          <a:fillRef idx="3">
+            <a:schemeClr val="accent1"/>
+          </a:fillRef>
+          <a:effectRef idx="2">
+            <a:schemeClr val="accent1"/>
+          </a:effectRef>
+          <a:fontRef idx="minor">
+            <a:schemeClr val="lt1"/>
+          </a:fontRef>
+        </p:style>
+        <p:txBody>
+          <a:bodyPr rtlCol="0" anchor="ctr"/>
+          <a:lstStyle/>
+          <a:p>
+            <a:pPr algn="ctr"/>
+            <a:r>
+              <a:rPr lang="en-US" sz="1600" dirty="0" smtClean="0"/>
               <a:t>Hive </a:t>
             </a:r>
             <a:r>
-              <a:rPr lang="en-US" dirty="0" err="1" smtClean="0"/>
+              <a:rPr lang="en-US" sz="1600" dirty="0" err="1" smtClean="0"/>
               <a:t>Cmdline</a:t>
             </a:r>
-            <a:endParaRPr lang="en-US" dirty="0"/>
+            <a:endParaRPr lang="en-US" sz="1600" dirty="0"/>
+          </a:p>
+        </p:txBody>
+      </p:sp>
+      <p:cxnSp>
+        <p:nvCxnSpPr>
+          <p:cNvPr id="54" name="Elbow Connector 53"/>
+          <p:cNvCxnSpPr>
+            <a:stCxn id="5" idx="3"/>
+          </p:cNvCxnSpPr>
+          <p:nvPr/>
+        </p:nvCxnSpPr>
+        <p:spPr>
+          <a:xfrm flipV="1">
+            <a:off x="2260573" y="3355444"/>
+            <a:ext cx="884154" cy="375053"/>
+          </a:xfrm>
+          <a:prstGeom prst="bentConnector3">
+            <a:avLst/>
+          </a:prstGeom>
+          <a:ln>
+            <a:headEnd type="arrow"/>
+            <a:tailEnd type="arrow"/>
+          </a:ln>
+        </p:spPr>
+        <p:style>
+          <a:lnRef idx="2">
+            <a:schemeClr val="accent1"/>
+          </a:lnRef>
+          <a:fillRef idx="0">
+            <a:schemeClr val="accent1"/>
+          </a:fillRef>
+          <a:effectRef idx="1">
+            <a:schemeClr val="accent1"/>
+          </a:effectRef>
+          <a:fontRef idx="minor">
+            <a:schemeClr val="tx1"/>
+          </a:fontRef>
+        </p:style>
+      </p:cxnSp>
+      <p:sp>
+        <p:nvSpPr>
+          <p:cNvPr id="20" name="Rectangle 19"/>
+          <p:cNvSpPr/>
+          <p:nvPr/>
+        </p:nvSpPr>
+        <p:spPr>
+          <a:xfrm>
+            <a:off x="3174442" y="4224968"/>
+            <a:ext cx="833109" cy="1270053"/>
+          </a:xfrm>
+          <a:prstGeom prst="rect">
+            <a:avLst/>
+          </a:prstGeom>
+        </p:spPr>
+        <p:style>
+          <a:lnRef idx="1">
+            <a:schemeClr val="accent1"/>
+          </a:lnRef>
+          <a:fillRef idx="3">
+            <a:schemeClr val="accent1"/>
+          </a:fillRef>
+          <a:effectRef idx="2">
+            <a:schemeClr val="accent1"/>
+          </a:effectRef>
+          <a:fontRef idx="minor">
+            <a:schemeClr val="lt1"/>
+          </a:fontRef>
+        </p:style>
+        <p:txBody>
+          <a:bodyPr rtlCol="0" anchor="ctr"/>
+          <a:lstStyle/>
+          <a:p>
+            <a:pPr algn="ctr"/>
+            <a:r>
+              <a:rPr lang="en-US" sz="1600" dirty="0" smtClean="0"/>
+              <a:t>Hive</a:t>
+            </a:r>
+          </a:p>
+          <a:p>
+            <a:pPr algn="ctr"/>
+            <a:r>
+              <a:rPr lang="en-US" sz="1600" dirty="0" smtClean="0"/>
+              <a:t>Agency</a:t>
+            </a:r>
+            <a:endParaRPr lang="en-US" sz="1600" dirty="0"/>
+          </a:p>
+        </p:txBody>
+      </p:sp>
+      <p:cxnSp>
+        <p:nvCxnSpPr>
+          <p:cNvPr id="22" name="Straight Arrow Connector 21"/>
+          <p:cNvCxnSpPr/>
+          <p:nvPr/>
+        </p:nvCxnSpPr>
+        <p:spPr>
+          <a:xfrm flipV="1">
+            <a:off x="4008176" y="4841339"/>
+            <a:ext cx="334203" cy="7784"/>
+          </a:xfrm>
+          <a:prstGeom prst="straightConnector1">
+            <a:avLst/>
+          </a:prstGeom>
+          <a:ln>
+            <a:headEnd type="arrow"/>
+            <a:tailEnd type="arrow"/>
+          </a:ln>
+        </p:spPr>
+        <p:style>
+          <a:lnRef idx="2">
+            <a:schemeClr val="accent1"/>
+          </a:lnRef>
+          <a:fillRef idx="0">
+            <a:schemeClr val="accent1"/>
+          </a:fillRef>
+          <a:effectRef idx="1">
+            <a:schemeClr val="accent1"/>
+          </a:effectRef>
+          <a:fontRef idx="minor">
+            <a:schemeClr val="tx1"/>
+          </a:fontRef>
+        </p:style>
+      </p:cxnSp>
+      <p:cxnSp>
+        <p:nvCxnSpPr>
+          <p:cNvPr id="8" name="Straight Arrow Connector 7"/>
+          <p:cNvCxnSpPr>
+            <a:stCxn id="3" idx="2"/>
+            <a:endCxn id="20" idx="0"/>
+          </p:cNvCxnSpPr>
+          <p:nvPr/>
+        </p:nvCxnSpPr>
+        <p:spPr>
+          <a:xfrm>
+            <a:off x="3581039" y="3677968"/>
+            <a:ext cx="9958" cy="547000"/>
+          </a:xfrm>
+          <a:prstGeom prst="straightConnector1">
+            <a:avLst/>
+          </a:prstGeom>
+          <a:ln>
+            <a:headEnd type="arrow"/>
+            <a:tailEnd type="arrow"/>
+          </a:ln>
+        </p:spPr>
+        <p:style>
+          <a:lnRef idx="2">
+            <a:schemeClr val="accent1"/>
+          </a:lnRef>
+          <a:fillRef idx="0">
+            <a:schemeClr val="accent1"/>
+          </a:fillRef>
+          <a:effectRef idx="1">
+            <a:schemeClr val="accent1"/>
+          </a:effectRef>
+          <a:fontRef idx="minor">
+            <a:schemeClr val="tx1"/>
+          </a:fontRef>
+        </p:style>
+      </p:cxnSp>
+      <p:sp>
+        <p:nvSpPr>
+          <p:cNvPr id="23" name="TextBox 22"/>
+          <p:cNvSpPr txBox="1"/>
+          <p:nvPr/>
+        </p:nvSpPr>
+        <p:spPr>
+          <a:xfrm>
+            <a:off x="3590997" y="3740169"/>
+            <a:ext cx="590526" cy="338554"/>
+          </a:xfrm>
+          <a:prstGeom prst="rect">
+            <a:avLst/>
+          </a:prstGeom>
+          <a:noFill/>
+        </p:spPr>
+        <p:txBody>
+          <a:bodyPr wrap="none" rtlCol="0">
+            <a:spAutoFit/>
+          </a:bodyPr>
+          <a:lstStyle/>
+          <a:p>
+            <a:r>
+              <a:rPr lang="en-US" sz="1600" dirty="0" smtClean="0"/>
+              <a:t>REST</a:t>
+            </a:r>
+            <a:endParaRPr lang="en-US" sz="1600" dirty="0"/>
           </a:p>
         </p:txBody>
       </p:sp>
     </p:spTree>
     <p:extLst>
       <p:ext uri="{BB962C8B-B14F-4D97-AF65-F5344CB8AC3E}">
-        <p14:creationId xmlns:p14="http://schemas.microsoft.com/office/powerpoint/2010/main" val="487298151"/>
+        <p14:creationId xmlns:p14="http://schemas.microsoft.com/office/powerpoint/2010/main" val="1504695248"/>
       </p:ext>
     </p:extLst>
   </p:cSld>

</xml_diff>